<commit_message>
Demo versione reactivated. PdfViewer added.
</commit_message>
<xml_diff>
--- a/assets/img/Schema_logico_sito.pptx
+++ b/assets/img/Schema_logico_sito.pptx
@@ -259,7 +259,7 @@
           <a:p>
             <a:fld id="{6C8AD715-A1C7-43F3-BAA8-4B848D72041B}" type="datetimeFigureOut">
               <a:rPr lang="it-IT" smtClean="0"/>
-              <a:t>11/10/2022</a:t>
+              <a:t>24/02/2023</a:t>
             </a:fld>
             <a:endParaRPr lang="it-IT"/>
           </a:p>
@@ -457,7 +457,7 @@
           <a:p>
             <a:fld id="{6C8AD715-A1C7-43F3-BAA8-4B848D72041B}" type="datetimeFigureOut">
               <a:rPr lang="it-IT" smtClean="0"/>
-              <a:t>11/10/2022</a:t>
+              <a:t>24/02/2023</a:t>
             </a:fld>
             <a:endParaRPr lang="it-IT"/>
           </a:p>
@@ -665,7 +665,7 @@
           <a:p>
             <a:fld id="{6C8AD715-A1C7-43F3-BAA8-4B848D72041B}" type="datetimeFigureOut">
               <a:rPr lang="it-IT" smtClean="0"/>
-              <a:t>11/10/2022</a:t>
+              <a:t>24/02/2023</a:t>
             </a:fld>
             <a:endParaRPr lang="it-IT"/>
           </a:p>
@@ -863,7 +863,7 @@
           <a:p>
             <a:fld id="{6C8AD715-A1C7-43F3-BAA8-4B848D72041B}" type="datetimeFigureOut">
               <a:rPr lang="it-IT" smtClean="0"/>
-              <a:t>11/10/2022</a:t>
+              <a:t>24/02/2023</a:t>
             </a:fld>
             <a:endParaRPr lang="it-IT"/>
           </a:p>
@@ -1138,7 +1138,7 @@
           <a:p>
             <a:fld id="{6C8AD715-A1C7-43F3-BAA8-4B848D72041B}" type="datetimeFigureOut">
               <a:rPr lang="it-IT" smtClean="0"/>
-              <a:t>11/10/2022</a:t>
+              <a:t>24/02/2023</a:t>
             </a:fld>
             <a:endParaRPr lang="it-IT"/>
           </a:p>
@@ -1403,7 +1403,7 @@
           <a:p>
             <a:fld id="{6C8AD715-A1C7-43F3-BAA8-4B848D72041B}" type="datetimeFigureOut">
               <a:rPr lang="it-IT" smtClean="0"/>
-              <a:t>11/10/2022</a:t>
+              <a:t>24/02/2023</a:t>
             </a:fld>
             <a:endParaRPr lang="it-IT"/>
           </a:p>
@@ -1815,7 +1815,7 @@
           <a:p>
             <a:fld id="{6C8AD715-A1C7-43F3-BAA8-4B848D72041B}" type="datetimeFigureOut">
               <a:rPr lang="it-IT" smtClean="0"/>
-              <a:t>11/10/2022</a:t>
+              <a:t>24/02/2023</a:t>
             </a:fld>
             <a:endParaRPr lang="it-IT"/>
           </a:p>
@@ -1956,7 +1956,7 @@
           <a:p>
             <a:fld id="{6C8AD715-A1C7-43F3-BAA8-4B848D72041B}" type="datetimeFigureOut">
               <a:rPr lang="it-IT" smtClean="0"/>
-              <a:t>11/10/2022</a:t>
+              <a:t>24/02/2023</a:t>
             </a:fld>
             <a:endParaRPr lang="it-IT"/>
           </a:p>
@@ -2069,7 +2069,7 @@
           <a:p>
             <a:fld id="{6C8AD715-A1C7-43F3-BAA8-4B848D72041B}" type="datetimeFigureOut">
               <a:rPr lang="it-IT" smtClean="0"/>
-              <a:t>11/10/2022</a:t>
+              <a:t>24/02/2023</a:t>
             </a:fld>
             <a:endParaRPr lang="it-IT"/>
           </a:p>
@@ -2380,7 +2380,7 @@
           <a:p>
             <a:fld id="{6C8AD715-A1C7-43F3-BAA8-4B848D72041B}" type="datetimeFigureOut">
               <a:rPr lang="it-IT" smtClean="0"/>
-              <a:t>11/10/2022</a:t>
+              <a:t>24/02/2023</a:t>
             </a:fld>
             <a:endParaRPr lang="it-IT"/>
           </a:p>
@@ -2668,7 +2668,7 @@
           <a:p>
             <a:fld id="{6C8AD715-A1C7-43F3-BAA8-4B848D72041B}" type="datetimeFigureOut">
               <a:rPr lang="it-IT" smtClean="0"/>
-              <a:t>11/10/2022</a:t>
+              <a:t>24/02/2023</a:t>
             </a:fld>
             <a:endParaRPr lang="it-IT"/>
           </a:p>
@@ -2909,7 +2909,7 @@
           <a:p>
             <a:fld id="{6C8AD715-A1C7-43F3-BAA8-4B848D72041B}" type="datetimeFigureOut">
               <a:rPr lang="it-IT" smtClean="0"/>
-              <a:t>11/10/2022</a:t>
+              <a:t>24/02/2023</a:t>
             </a:fld>
             <a:endParaRPr lang="it-IT"/>
           </a:p>
@@ -4360,94 +4360,6 @@
       </p:sp>
       <p:cxnSp>
         <p:nvCxnSpPr>
-          <p:cNvPr id="4" name="Connettore diritto 3">
-            <a:extLst>
-              <a:ext uri="{FF2B5EF4-FFF2-40B4-BE49-F238E27FC236}">
-                <a16:creationId xmlns:a16="http://schemas.microsoft.com/office/drawing/2014/main" id="{B6BBB133-239A-32AE-D911-695BD8084066}"/>
-              </a:ext>
-            </a:extLst>
-          </p:cNvPr>
-          <p:cNvCxnSpPr>
-            <a:cxnSpLocks/>
-          </p:cNvCxnSpPr>
-          <p:nvPr/>
-        </p:nvCxnSpPr>
-        <p:spPr>
-          <a:xfrm>
-            <a:off x="4859869" y="2069976"/>
-            <a:ext cx="2273417" cy="543242"/>
-          </a:xfrm>
-          <a:prstGeom prst="line">
-            <a:avLst/>
-          </a:prstGeom>
-          <a:ln w="38100">
-            <a:solidFill>
-              <a:srgbClr val="C00000"/>
-            </a:solidFill>
-            <a:prstDash val="lgDash"/>
-          </a:ln>
-        </p:spPr>
-        <p:style>
-          <a:lnRef idx="1">
-            <a:schemeClr val="dk1"/>
-          </a:lnRef>
-          <a:fillRef idx="0">
-            <a:schemeClr val="dk1"/>
-          </a:fillRef>
-          <a:effectRef idx="0">
-            <a:schemeClr val="dk1"/>
-          </a:effectRef>
-          <a:fontRef idx="minor">
-            <a:schemeClr val="tx1"/>
-          </a:fontRef>
-        </p:style>
-      </p:cxnSp>
-      <p:cxnSp>
-        <p:nvCxnSpPr>
-          <p:cNvPr id="12" name="Connettore diritto 11">
-            <a:extLst>
-              <a:ext uri="{FF2B5EF4-FFF2-40B4-BE49-F238E27FC236}">
-                <a16:creationId xmlns:a16="http://schemas.microsoft.com/office/drawing/2014/main" id="{29F7A4E2-028A-CB14-4CCE-935F9FFB82A0}"/>
-              </a:ext>
-            </a:extLst>
-          </p:cNvPr>
-          <p:cNvCxnSpPr>
-            <a:cxnSpLocks/>
-          </p:cNvCxnSpPr>
-          <p:nvPr/>
-        </p:nvCxnSpPr>
-        <p:spPr>
-          <a:xfrm>
-            <a:off x="4859869" y="3328944"/>
-            <a:ext cx="2273417" cy="545285"/>
-          </a:xfrm>
-          <a:prstGeom prst="line">
-            <a:avLst/>
-          </a:prstGeom>
-          <a:ln w="38100">
-            <a:solidFill>
-              <a:srgbClr val="C00000"/>
-            </a:solidFill>
-            <a:prstDash val="lgDash"/>
-          </a:ln>
-        </p:spPr>
-        <p:style>
-          <a:lnRef idx="1">
-            <a:schemeClr val="dk1"/>
-          </a:lnRef>
-          <a:fillRef idx="0">
-            <a:schemeClr val="dk1"/>
-          </a:fillRef>
-          <a:effectRef idx="0">
-            <a:schemeClr val="dk1"/>
-          </a:effectRef>
-          <a:fontRef idx="minor">
-            <a:schemeClr val="tx1"/>
-          </a:fontRef>
-        </p:style>
-      </p:cxnSp>
-      <p:cxnSp>
-        <p:nvCxnSpPr>
           <p:cNvPr id="33" name="Connettore diritto 32">
             <a:extLst>
               <a:ext uri="{FF2B5EF4-FFF2-40B4-BE49-F238E27FC236}">
@@ -4490,6 +4402,64 @@
           </a:fontRef>
         </p:style>
       </p:cxnSp>
+      <p:sp>
+        <p:nvSpPr>
+          <p:cNvPr id="6" name="Rettangolo con due angoli in diagonale ritagliati 5">
+            <a:extLst>
+              <a:ext uri="{FF2B5EF4-FFF2-40B4-BE49-F238E27FC236}">
+                <a16:creationId xmlns:a16="http://schemas.microsoft.com/office/drawing/2014/main" id="{16FBC47B-999C-7A07-016A-51484966F150}"/>
+              </a:ext>
+            </a:extLst>
+          </p:cNvPr>
+          <p:cNvSpPr/>
+          <p:nvPr/>
+        </p:nvSpPr>
+        <p:spPr>
+          <a:xfrm>
+            <a:off x="6918667" y="4214241"/>
+            <a:ext cx="2273417" cy="545284"/>
+          </a:xfrm>
+          <a:prstGeom prst="snip2DiagRect">
+            <a:avLst/>
+          </a:prstGeom>
+          <a:ln w="28575">
+            <a:solidFill>
+              <a:schemeClr val="tx1"/>
+            </a:solidFill>
+          </a:ln>
+        </p:spPr>
+        <p:style>
+          <a:lnRef idx="2">
+            <a:schemeClr val="accent1">
+              <a:shade val="50000"/>
+            </a:schemeClr>
+          </a:lnRef>
+          <a:fillRef idx="1">
+            <a:schemeClr val="accent1"/>
+          </a:fillRef>
+          <a:effectRef idx="0">
+            <a:schemeClr val="accent1"/>
+          </a:effectRef>
+          <a:fontRef idx="minor">
+            <a:schemeClr val="lt1"/>
+          </a:fontRef>
+        </p:style>
+        <p:txBody>
+          <a:bodyPr rtlCol="0" anchor="ctr"/>
+          <a:lstStyle/>
+          <a:p>
+            <a:pPr algn="ctr"/>
+            <a:r>
+              <a:rPr lang="it-IT" dirty="0">
+                <a:solidFill>
+                  <a:schemeClr val="bg1"/>
+                </a:solidFill>
+              </a:rPr>
+              <a:t>Visualizzatore PDF</a:t>
+            </a:r>
+          </a:p>
+        </p:txBody>
+      </p:sp>
     </p:spTree>
     <p:extLst>
       <p:ext uri="{BB962C8B-B14F-4D97-AF65-F5344CB8AC3E}">

</xml_diff>